<commit_message>
Inserido totalizador de HORAS no Resumo dos PADs
</commit_message>
<xml_diff>
--- a/Apresentações - ATAS de Reunião/Apresentacao Horas x Setores.pptx
+++ b/Apresentações - ATAS de Reunião/Apresentacao Horas x Setores.pptx
@@ -9,12 +9,11 @@
     <p:sldId id="258" r:id="rId3"/>
     <p:sldId id="259" r:id="rId4"/>
     <p:sldId id="260" r:id="rId5"/>
-    <p:sldId id="261" r:id="rId6"/>
-    <p:sldId id="264" r:id="rId7"/>
-    <p:sldId id="265" r:id="rId8"/>
-    <p:sldId id="262" r:id="rId9"/>
-    <p:sldId id="266" r:id="rId10"/>
-    <p:sldId id="267" r:id="rId11"/>
+    <p:sldId id="264" r:id="rId6"/>
+    <p:sldId id="265" r:id="rId7"/>
+    <p:sldId id="262" r:id="rId8"/>
+    <p:sldId id="266" r:id="rId9"/>
+    <p:sldId id="267" r:id="rId10"/>
   </p:sldIdLst>
   <p:sldSz cx="12192000" cy="6858000"/>
   <p:notesSz cx="6858000" cy="9144000"/>
@@ -113,6 +112,11 @@
       </a:defRPr>
     </a:lvl9pPr>
   </p:defaultTextStyle>
+  <p:extLst>
+    <p:ext uri="{EFAFB233-063F-42B5-8137-9DF3F51BA10A}">
+      <p15:sldGuideLst xmlns:p15="http://schemas.microsoft.com/office/powerpoint/2012/main"/>
+    </p:ext>
+  </p:extLst>
 </p:presentation>
 </file>
 
@@ -247,7 +251,7 @@
           <a:p>
             <a:fld id="{F1E3545B-8CF4-43D1-8492-6EADB7639903}" type="datetimeFigureOut">
               <a:rPr lang="pt-BR" smtClean="0"/>
-              <a:t>13/03/2017</a:t>
+              <a:t>14/03/2017</a:t>
             </a:fld>
             <a:endParaRPr lang="pt-BR"/>
           </a:p>
@@ -417,7 +421,7 @@
           <a:p>
             <a:fld id="{F1E3545B-8CF4-43D1-8492-6EADB7639903}" type="datetimeFigureOut">
               <a:rPr lang="pt-BR" smtClean="0"/>
-              <a:t>13/03/2017</a:t>
+              <a:t>14/03/2017</a:t>
             </a:fld>
             <a:endParaRPr lang="pt-BR"/>
           </a:p>
@@ -597,7 +601,7 @@
           <a:p>
             <a:fld id="{F1E3545B-8CF4-43D1-8492-6EADB7639903}" type="datetimeFigureOut">
               <a:rPr lang="pt-BR" smtClean="0"/>
-              <a:t>13/03/2017</a:t>
+              <a:t>14/03/2017</a:t>
             </a:fld>
             <a:endParaRPr lang="pt-BR"/>
           </a:p>
@@ -767,7 +771,7 @@
           <a:p>
             <a:fld id="{F1E3545B-8CF4-43D1-8492-6EADB7639903}" type="datetimeFigureOut">
               <a:rPr lang="pt-BR" smtClean="0"/>
-              <a:t>13/03/2017</a:t>
+              <a:t>14/03/2017</a:t>
             </a:fld>
             <a:endParaRPr lang="pt-BR"/>
           </a:p>
@@ -1013,7 +1017,7 @@
           <a:p>
             <a:fld id="{F1E3545B-8CF4-43D1-8492-6EADB7639903}" type="datetimeFigureOut">
               <a:rPr lang="pt-BR" smtClean="0"/>
-              <a:t>13/03/2017</a:t>
+              <a:t>14/03/2017</a:t>
             </a:fld>
             <a:endParaRPr lang="pt-BR"/>
           </a:p>
@@ -1245,7 +1249,7 @@
           <a:p>
             <a:fld id="{F1E3545B-8CF4-43D1-8492-6EADB7639903}" type="datetimeFigureOut">
               <a:rPr lang="pt-BR" smtClean="0"/>
-              <a:t>13/03/2017</a:t>
+              <a:t>14/03/2017</a:t>
             </a:fld>
             <a:endParaRPr lang="pt-BR"/>
           </a:p>
@@ -1612,7 +1616,7 @@
           <a:p>
             <a:fld id="{F1E3545B-8CF4-43D1-8492-6EADB7639903}" type="datetimeFigureOut">
               <a:rPr lang="pt-BR" smtClean="0"/>
-              <a:t>13/03/2017</a:t>
+              <a:t>14/03/2017</a:t>
             </a:fld>
             <a:endParaRPr lang="pt-BR"/>
           </a:p>
@@ -1730,7 +1734,7 @@
           <a:p>
             <a:fld id="{F1E3545B-8CF4-43D1-8492-6EADB7639903}" type="datetimeFigureOut">
               <a:rPr lang="pt-BR" smtClean="0"/>
-              <a:t>13/03/2017</a:t>
+              <a:t>14/03/2017</a:t>
             </a:fld>
             <a:endParaRPr lang="pt-BR"/>
           </a:p>
@@ -1825,7 +1829,7 @@
           <a:p>
             <a:fld id="{F1E3545B-8CF4-43D1-8492-6EADB7639903}" type="datetimeFigureOut">
               <a:rPr lang="pt-BR" smtClean="0"/>
-              <a:t>13/03/2017</a:t>
+              <a:t>14/03/2017</a:t>
             </a:fld>
             <a:endParaRPr lang="pt-BR"/>
           </a:p>
@@ -2102,7 +2106,7 @@
           <a:p>
             <a:fld id="{F1E3545B-8CF4-43D1-8492-6EADB7639903}" type="datetimeFigureOut">
               <a:rPr lang="pt-BR" smtClean="0"/>
-              <a:t>13/03/2017</a:t>
+              <a:t>14/03/2017</a:t>
             </a:fld>
             <a:endParaRPr lang="pt-BR"/>
           </a:p>
@@ -2355,7 +2359,7 @@
           <a:p>
             <a:fld id="{F1E3545B-8CF4-43D1-8492-6EADB7639903}" type="datetimeFigureOut">
               <a:rPr lang="pt-BR" smtClean="0"/>
-              <a:t>13/03/2017</a:t>
+              <a:t>14/03/2017</a:t>
             </a:fld>
             <a:endParaRPr lang="pt-BR"/>
           </a:p>
@@ -2568,7 +2572,7 @@
           <a:p>
             <a:fld id="{F1E3545B-8CF4-43D1-8492-6EADB7639903}" type="datetimeFigureOut">
               <a:rPr lang="pt-BR" smtClean="0"/>
-              <a:t>13/03/2017</a:t>
+              <a:t>14/03/2017</a:t>
             </a:fld>
             <a:endParaRPr lang="pt-BR"/>
           </a:p>
@@ -3017,94 +3021,6 @@
 </p:sld>
 </file>
 
-<file path=ppt/slides/slide10.xml><?xml version="1.0" encoding="utf-8"?>
-<p:sld xmlns:a="http://schemas.openxmlformats.org/drawingml/2006/main" xmlns:r="http://schemas.openxmlformats.org/officeDocument/2006/relationships" xmlns:p="http://schemas.openxmlformats.org/presentationml/2006/main">
-  <p:cSld>
-    <p:spTree>
-      <p:nvGrpSpPr>
-        <p:cNvPr id="1" name=""/>
-        <p:cNvGrpSpPr/>
-        <p:nvPr/>
-      </p:nvGrpSpPr>
-      <p:grpSpPr>
-        <a:xfrm>
-          <a:off x="0" y="0"/>
-          <a:ext cx="0" cy="0"/>
-          <a:chOff x="0" y="0"/>
-          <a:chExt cx="0" cy="0"/>
-        </a:xfrm>
-      </p:grpSpPr>
-      <p:sp>
-        <p:nvSpPr>
-          <p:cNvPr id="2" name="Title 1"/>
-          <p:cNvSpPr>
-            <a:spLocks noGrp="1"/>
-          </p:cNvSpPr>
-          <p:nvPr>
-            <p:ph type="title"/>
-          </p:nvPr>
-        </p:nvSpPr>
-        <p:spPr/>
-        <p:txBody>
-          <a:bodyPr/>
-          <a:lstStyle/>
-          <a:p>
-            <a:endParaRPr lang="pt-BR"/>
-          </a:p>
-        </p:txBody>
-      </p:sp>
-      <p:sp>
-        <p:nvSpPr>
-          <p:cNvPr id="3" name="Content Placeholder 2"/>
-          <p:cNvSpPr>
-            <a:spLocks noGrp="1"/>
-          </p:cNvSpPr>
-          <p:nvPr>
-            <p:ph idx="1"/>
-          </p:nvPr>
-        </p:nvSpPr>
-        <p:spPr/>
-        <p:txBody>
-          <a:bodyPr/>
-          <a:lstStyle/>
-          <a:p>
-            <a:r>
-              <a:rPr lang="en-US" dirty="0" smtClean="0"/>
-              <a:t>Alter</a:t>
-            </a:r>
-            <a:r>
-              <a:rPr lang="pt-BR" dirty="0" smtClean="0"/>
-              <a:t>ação dos Somatorios</a:t>
-            </a:r>
-          </a:p>
-          <a:p>
-            <a:r>
-              <a:rPr lang="pt-BR" dirty="0" smtClean="0"/>
-              <a:t>Alteração das Medias</a:t>
-            </a:r>
-          </a:p>
-          <a:p>
-            <a:r>
-              <a:rPr lang="pt-BR" dirty="0" smtClean="0"/>
-              <a:t>Alteração da Meta</a:t>
-            </a:r>
-            <a:endParaRPr lang="pt-BR" dirty="0"/>
-          </a:p>
-        </p:txBody>
-      </p:sp>
-    </p:spTree>
-    <p:extLst>
-      <p:ext uri="{BB962C8B-B14F-4D97-AF65-F5344CB8AC3E}">
-        <p14:creationId xmlns:p14="http://schemas.microsoft.com/office/powerpoint/2010/main" val="3296057671"/>
-      </p:ext>
-    </p:extLst>
-  </p:cSld>
-  <p:clrMapOvr>
-    <a:masterClrMapping/>
-  </p:clrMapOvr>
-</p:sld>
-</file>
-
 <file path=ppt/slides/slide2.xml><?xml version="1.0" encoding="utf-8"?>
 <p:sld xmlns:a="http://schemas.openxmlformats.org/drawingml/2006/main" xmlns:r="http://schemas.openxmlformats.org/officeDocument/2006/relationships" xmlns:p="http://schemas.openxmlformats.org/presentationml/2006/main">
   <p:cSld>
@@ -3329,704 +3245,6 @@
           <a:chExt cx="0" cy="0"/>
         </a:xfrm>
       </p:grpSpPr>
-      <p:pic>
-        <p:nvPicPr>
-          <p:cNvPr id="2" name="Picture 1"/>
-          <p:cNvPicPr>
-            <a:picLocks noChangeAspect="1"/>
-          </p:cNvPicPr>
-          <p:nvPr/>
-        </p:nvPicPr>
-        <p:blipFill>
-          <a:blip r:embed="rId2"/>
-          <a:stretch>
-            <a:fillRect/>
-          </a:stretch>
-        </p:blipFill>
-        <p:spPr>
-          <a:xfrm>
-            <a:off x="259445" y="1319891"/>
-            <a:ext cx="6477000" cy="4305300"/>
-          </a:xfrm>
-          <a:prstGeom prst="rect">
-            <a:avLst/>
-          </a:prstGeom>
-        </p:spPr>
-      </p:pic>
-      <p:sp>
-        <p:nvSpPr>
-          <p:cNvPr id="6" name="Right Arrow 5"/>
-          <p:cNvSpPr/>
-          <p:nvPr/>
-        </p:nvSpPr>
-        <p:spPr>
-          <a:xfrm>
-            <a:off x="6858000" y="3086100"/>
-            <a:ext cx="784860" cy="312420"/>
-          </a:xfrm>
-          <a:prstGeom prst="rightArrow">
-            <a:avLst/>
-          </a:prstGeom>
-          <a:solidFill>
-            <a:schemeClr val="accent2"/>
-          </a:solidFill>
-        </p:spPr>
-        <p:style>
-          <a:lnRef idx="2">
-            <a:schemeClr val="accent1">
-              <a:shade val="50000"/>
-            </a:schemeClr>
-          </a:lnRef>
-          <a:fillRef idx="1">
-            <a:schemeClr val="accent1"/>
-          </a:fillRef>
-          <a:effectRef idx="0">
-            <a:schemeClr val="accent1"/>
-          </a:effectRef>
-          <a:fontRef idx="minor">
-            <a:schemeClr val="lt1"/>
-          </a:fontRef>
-        </p:style>
-        <p:txBody>
-          <a:bodyPr rtlCol="0" anchor="ctr"/>
-          <a:lstStyle/>
-          <a:p>
-            <a:pPr algn="ctr"/>
-            <a:endParaRPr lang="pt-BR"/>
-          </a:p>
-        </p:txBody>
-      </p:sp>
-      <p:sp>
-        <p:nvSpPr>
-          <p:cNvPr id="7" name="Rounded Rectangle 6"/>
-          <p:cNvSpPr/>
-          <p:nvPr/>
-        </p:nvSpPr>
-        <p:spPr>
-          <a:xfrm>
-            <a:off x="7701910" y="3040380"/>
-            <a:ext cx="1189673" cy="388620"/>
-          </a:xfrm>
-          <a:prstGeom prst="roundRect">
-            <a:avLst/>
-          </a:prstGeom>
-          <a:solidFill>
-            <a:schemeClr val="accent2"/>
-          </a:solidFill>
-        </p:spPr>
-        <p:style>
-          <a:lnRef idx="2">
-            <a:schemeClr val="accent1">
-              <a:shade val="50000"/>
-            </a:schemeClr>
-          </a:lnRef>
-          <a:fillRef idx="1">
-            <a:schemeClr val="accent1"/>
-          </a:fillRef>
-          <a:effectRef idx="0">
-            <a:schemeClr val="accent1"/>
-          </a:effectRef>
-          <a:fontRef idx="minor">
-            <a:schemeClr val="lt1"/>
-          </a:fontRef>
-        </p:style>
-        <p:txBody>
-          <a:bodyPr rtlCol="0" anchor="ctr"/>
-          <a:lstStyle/>
-          <a:p>
-            <a:pPr algn="ctr"/>
-            <a:r>
-              <a:rPr lang="pt-BR" sz="1400" dirty="0" smtClean="0"/>
-              <a:t>Pouco mais </a:t>
-            </a:r>
-          </a:p>
-          <a:p>
-            <a:pPr algn="ctr"/>
-            <a:r>
-              <a:rPr lang="pt-BR" sz="1400" dirty="0" smtClean="0"/>
-              <a:t>que 2 horas</a:t>
-            </a:r>
-            <a:endParaRPr lang="pt-BR" sz="1400" dirty="0"/>
-          </a:p>
-        </p:txBody>
-      </p:sp>
-      <p:sp>
-        <p:nvSpPr>
-          <p:cNvPr id="8" name="Right Arrow 7"/>
-          <p:cNvSpPr/>
-          <p:nvPr/>
-        </p:nvSpPr>
-        <p:spPr>
-          <a:xfrm>
-            <a:off x="6858000" y="3509010"/>
-            <a:ext cx="784860" cy="312420"/>
-          </a:xfrm>
-          <a:prstGeom prst="rightArrow">
-            <a:avLst/>
-          </a:prstGeom>
-          <a:solidFill>
-            <a:schemeClr val="accent2"/>
-          </a:solidFill>
-        </p:spPr>
-        <p:style>
-          <a:lnRef idx="2">
-            <a:schemeClr val="accent1">
-              <a:shade val="50000"/>
-            </a:schemeClr>
-          </a:lnRef>
-          <a:fillRef idx="1">
-            <a:schemeClr val="accent1"/>
-          </a:fillRef>
-          <a:effectRef idx="0">
-            <a:schemeClr val="accent1"/>
-          </a:effectRef>
-          <a:fontRef idx="minor">
-            <a:schemeClr val="lt1"/>
-          </a:fontRef>
-        </p:style>
-        <p:txBody>
-          <a:bodyPr rtlCol="0" anchor="ctr"/>
-          <a:lstStyle/>
-          <a:p>
-            <a:pPr algn="ctr"/>
-            <a:endParaRPr lang="pt-BR"/>
-          </a:p>
-        </p:txBody>
-      </p:sp>
-      <p:sp>
-        <p:nvSpPr>
-          <p:cNvPr id="9" name="Rounded Rectangle 8"/>
-          <p:cNvSpPr/>
-          <p:nvPr/>
-        </p:nvSpPr>
-        <p:spPr>
-          <a:xfrm>
-            <a:off x="7701910" y="3493770"/>
-            <a:ext cx="1189673" cy="388620"/>
-          </a:xfrm>
-          <a:prstGeom prst="roundRect">
-            <a:avLst/>
-          </a:prstGeom>
-          <a:solidFill>
-            <a:schemeClr val="accent2"/>
-          </a:solidFill>
-        </p:spPr>
-        <p:style>
-          <a:lnRef idx="2">
-            <a:schemeClr val="accent1">
-              <a:shade val="50000"/>
-            </a:schemeClr>
-          </a:lnRef>
-          <a:fillRef idx="1">
-            <a:schemeClr val="accent1"/>
-          </a:fillRef>
-          <a:effectRef idx="0">
-            <a:schemeClr val="accent1"/>
-          </a:effectRef>
-          <a:fontRef idx="minor">
-            <a:schemeClr val="lt1"/>
-          </a:fontRef>
-        </p:style>
-        <p:txBody>
-          <a:bodyPr rtlCol="0" anchor="ctr"/>
-          <a:lstStyle/>
-          <a:p>
-            <a:pPr algn="ctr"/>
-            <a:r>
-              <a:rPr lang="pt-BR" sz="1400" dirty="0" smtClean="0"/>
-              <a:t>Quase 2 dias</a:t>
-            </a:r>
-            <a:endParaRPr lang="pt-BR" sz="1400" dirty="0"/>
-          </a:p>
-        </p:txBody>
-      </p:sp>
-      <p:sp>
-        <p:nvSpPr>
-          <p:cNvPr id="12" name="Right Arrow 11"/>
-          <p:cNvSpPr/>
-          <p:nvPr/>
-        </p:nvSpPr>
-        <p:spPr>
-          <a:xfrm>
-            <a:off x="6858000" y="4156710"/>
-            <a:ext cx="784860" cy="312420"/>
-          </a:xfrm>
-          <a:prstGeom prst="rightArrow">
-            <a:avLst/>
-          </a:prstGeom>
-          <a:solidFill>
-            <a:schemeClr val="accent2"/>
-          </a:solidFill>
-        </p:spPr>
-        <p:style>
-          <a:lnRef idx="2">
-            <a:schemeClr val="accent1">
-              <a:shade val="50000"/>
-            </a:schemeClr>
-          </a:lnRef>
-          <a:fillRef idx="1">
-            <a:schemeClr val="accent1"/>
-          </a:fillRef>
-          <a:effectRef idx="0">
-            <a:schemeClr val="accent1"/>
-          </a:effectRef>
-          <a:fontRef idx="minor">
-            <a:schemeClr val="lt1"/>
-          </a:fontRef>
-        </p:style>
-        <p:txBody>
-          <a:bodyPr rtlCol="0" anchor="ctr"/>
-          <a:lstStyle/>
-          <a:p>
-            <a:pPr algn="ctr"/>
-            <a:endParaRPr lang="pt-BR"/>
-          </a:p>
-        </p:txBody>
-      </p:sp>
-      <p:sp>
-        <p:nvSpPr>
-          <p:cNvPr id="13" name="Rounded Rectangle 12"/>
-          <p:cNvSpPr/>
-          <p:nvPr/>
-        </p:nvSpPr>
-        <p:spPr>
-          <a:xfrm>
-            <a:off x="7701910" y="4141470"/>
-            <a:ext cx="1189673" cy="388620"/>
-          </a:xfrm>
-          <a:prstGeom prst="roundRect">
-            <a:avLst/>
-          </a:prstGeom>
-          <a:solidFill>
-            <a:schemeClr val="accent2"/>
-          </a:solidFill>
-        </p:spPr>
-        <p:style>
-          <a:lnRef idx="2">
-            <a:schemeClr val="accent1">
-              <a:shade val="50000"/>
-            </a:schemeClr>
-          </a:lnRef>
-          <a:fillRef idx="1">
-            <a:schemeClr val="accent1"/>
-          </a:fillRef>
-          <a:effectRef idx="0">
-            <a:schemeClr val="accent1"/>
-          </a:effectRef>
-          <a:fontRef idx="minor">
-            <a:schemeClr val="lt1"/>
-          </a:fontRef>
-        </p:style>
-        <p:txBody>
-          <a:bodyPr rtlCol="0" anchor="ctr"/>
-          <a:lstStyle/>
-          <a:p>
-            <a:pPr algn="ctr"/>
-            <a:r>
-              <a:rPr lang="pt-BR" sz="1400" dirty="0" smtClean="0"/>
-              <a:t>1 Dia e 3 horas</a:t>
-            </a:r>
-            <a:endParaRPr lang="pt-BR" sz="1400" dirty="0"/>
-          </a:p>
-        </p:txBody>
-      </p:sp>
-      <p:sp>
-        <p:nvSpPr>
-          <p:cNvPr id="14" name="Right Arrow 13"/>
-          <p:cNvSpPr/>
-          <p:nvPr/>
-        </p:nvSpPr>
-        <p:spPr>
-          <a:xfrm rot="1755553">
-            <a:off x="6885059" y="4613065"/>
-            <a:ext cx="784860" cy="312420"/>
-          </a:xfrm>
-          <a:prstGeom prst="rightArrow">
-            <a:avLst/>
-          </a:prstGeom>
-          <a:solidFill>
-            <a:schemeClr val="accent2"/>
-          </a:solidFill>
-        </p:spPr>
-        <p:style>
-          <a:lnRef idx="2">
-            <a:schemeClr val="accent1">
-              <a:shade val="50000"/>
-            </a:schemeClr>
-          </a:lnRef>
-          <a:fillRef idx="1">
-            <a:schemeClr val="accent1"/>
-          </a:fillRef>
-          <a:effectRef idx="0">
-            <a:schemeClr val="accent1"/>
-          </a:effectRef>
-          <a:fontRef idx="minor">
-            <a:schemeClr val="lt1"/>
-          </a:fontRef>
-        </p:style>
-        <p:txBody>
-          <a:bodyPr rtlCol="0" anchor="ctr"/>
-          <a:lstStyle/>
-          <a:p>
-            <a:pPr algn="ctr"/>
-            <a:endParaRPr lang="pt-BR"/>
-          </a:p>
-        </p:txBody>
-      </p:sp>
-      <p:sp>
-        <p:nvSpPr>
-          <p:cNvPr id="15" name="Rounded Rectangle 14"/>
-          <p:cNvSpPr/>
-          <p:nvPr/>
-        </p:nvSpPr>
-        <p:spPr>
-          <a:xfrm>
-            <a:off x="7701910" y="4617720"/>
-            <a:ext cx="1189673" cy="388620"/>
-          </a:xfrm>
-          <a:prstGeom prst="roundRect">
-            <a:avLst/>
-          </a:prstGeom>
-          <a:solidFill>
-            <a:schemeClr val="accent2"/>
-          </a:solidFill>
-        </p:spPr>
-        <p:style>
-          <a:lnRef idx="2">
-            <a:schemeClr val="accent1">
-              <a:shade val="50000"/>
-            </a:schemeClr>
-          </a:lnRef>
-          <a:fillRef idx="1">
-            <a:schemeClr val="accent1"/>
-          </a:fillRef>
-          <a:effectRef idx="0">
-            <a:schemeClr val="accent1"/>
-          </a:effectRef>
-          <a:fontRef idx="minor">
-            <a:schemeClr val="lt1"/>
-          </a:fontRef>
-        </p:style>
-        <p:txBody>
-          <a:bodyPr rtlCol="0" anchor="ctr"/>
-          <a:lstStyle/>
-          <a:p>
-            <a:pPr algn="ctr"/>
-            <a:r>
-              <a:rPr lang="pt-BR" sz="1400" dirty="0" smtClean="0"/>
-              <a:t>Quase 1 dia </a:t>
-            </a:r>
-          </a:p>
-          <a:p>
-            <a:pPr algn="ctr"/>
-            <a:r>
-              <a:rPr lang="pt-BR" sz="1400" dirty="0" smtClean="0"/>
-              <a:t>(23 horas)</a:t>
-            </a:r>
-            <a:endParaRPr lang="pt-BR" sz="1400" dirty="0"/>
-          </a:p>
-        </p:txBody>
-      </p:sp>
-      <p:graphicFrame>
-        <p:nvGraphicFramePr>
-          <p:cNvPr id="17" name="Table 16"/>
-          <p:cNvGraphicFramePr>
-            <a:graphicFrameLocks noGrp="1"/>
-          </p:cNvGraphicFramePr>
-          <p:nvPr>
-            <p:extLst>
-              <p:ext uri="{D42A27DB-BD31-4B8C-83A1-F6EECF244321}">
-                <p14:modId xmlns:p14="http://schemas.microsoft.com/office/powerpoint/2010/main" val="3867276699"/>
-              </p:ext>
-            </p:extLst>
-          </p:nvPr>
-        </p:nvGraphicFramePr>
-        <p:xfrm>
-          <a:off x="8950633" y="2440521"/>
-          <a:ext cx="3038168" cy="2656840"/>
-        </p:xfrm>
-        <a:graphic>
-          <a:graphicData uri="http://schemas.openxmlformats.org/drawingml/2006/table">
-            <a:tbl>
-              <a:tblPr firstRow="1" bandRow="1">
-                <a:tableStyleId>{073A0DAA-6AF3-43AB-8588-CEC1D06C72B9}</a:tableStyleId>
-              </a:tblPr>
-              <a:tblGrid>
-                <a:gridCol w="1519084"/>
-                <a:gridCol w="1519084"/>
-              </a:tblGrid>
-              <a:tr h="531368">
-                <a:tc>
-                  <a:txBody>
-                    <a:bodyPr/>
-                    <a:lstStyle/>
-                    <a:p>
-                      <a:r>
-                        <a:rPr lang="en-US" sz="1200" dirty="0" err="1" smtClean="0"/>
-                        <a:t>Calculo</a:t>
-                      </a:r>
-                      <a:r>
-                        <a:rPr lang="en-US" sz="1200" dirty="0" smtClean="0"/>
-                        <a:t> </a:t>
-                      </a:r>
-                      <a:r>
-                        <a:rPr lang="en-US" sz="1200" dirty="0" err="1" smtClean="0"/>
-                        <a:t>inicial</a:t>
-                      </a:r>
-                      <a:endParaRPr lang="en-US" sz="1200" dirty="0" smtClean="0"/>
-                    </a:p>
-                    <a:p>
-                      <a:r>
-                        <a:rPr lang="en-US" sz="1200" dirty="0" smtClean="0"/>
-                        <a:t>(</a:t>
-                      </a:r>
-                      <a:r>
-                        <a:rPr lang="en-US" sz="1200" dirty="0" err="1" smtClean="0"/>
-                        <a:t>Apenas</a:t>
-                      </a:r>
-                      <a:r>
-                        <a:rPr lang="en-US" sz="1200" baseline="0" dirty="0" smtClean="0"/>
-                        <a:t> </a:t>
-                      </a:r>
-                      <a:r>
-                        <a:rPr lang="en-US" sz="1200" baseline="0" dirty="0" err="1" smtClean="0"/>
-                        <a:t>dias</a:t>
-                      </a:r>
-                      <a:r>
-                        <a:rPr lang="en-US" sz="1200" baseline="0" dirty="0" smtClean="0"/>
-                        <a:t>)</a:t>
-                      </a:r>
-                      <a:endParaRPr lang="pt-BR" sz="1200" dirty="0"/>
-                    </a:p>
-                  </a:txBody>
-                  <a:tcPr/>
-                </a:tc>
-                <a:tc>
-                  <a:txBody>
-                    <a:bodyPr/>
-                    <a:lstStyle/>
-                    <a:p>
-                      <a:r>
-                        <a:rPr lang="en-US" sz="1200" dirty="0" err="1" smtClean="0"/>
-                        <a:t>Calculo</a:t>
-                      </a:r>
-                      <a:r>
-                        <a:rPr lang="en-US" sz="1200" baseline="0" dirty="0" smtClean="0"/>
-                        <a:t> Real</a:t>
-                      </a:r>
-                    </a:p>
-                    <a:p>
-                      <a:r>
-                        <a:rPr lang="en-US" sz="1200" baseline="0" dirty="0" smtClean="0"/>
-                        <a:t>(</a:t>
-                      </a:r>
-                      <a:r>
-                        <a:rPr lang="en-US" sz="1200" baseline="0" dirty="0" err="1" smtClean="0"/>
-                        <a:t>Apenas</a:t>
-                      </a:r>
-                      <a:r>
-                        <a:rPr lang="en-US" sz="1200" baseline="0" dirty="0" smtClean="0"/>
-                        <a:t> horas)</a:t>
-                      </a:r>
-                      <a:endParaRPr lang="pt-BR" sz="1200" dirty="0"/>
-                    </a:p>
-                  </a:txBody>
-                  <a:tcPr/>
-                </a:tc>
-              </a:tr>
-              <a:tr h="531368">
-                <a:tc>
-                  <a:txBody>
-                    <a:bodyPr/>
-                    <a:lstStyle/>
-                    <a:p>
-                      <a:r>
-                        <a:rPr lang="en-US" sz="1200" dirty="0" smtClean="0"/>
-                        <a:t>1 </a:t>
-                      </a:r>
-                      <a:r>
-                        <a:rPr lang="en-US" sz="1200" dirty="0" err="1" smtClean="0"/>
-                        <a:t>dia</a:t>
-                      </a:r>
-                      <a:r>
-                        <a:rPr lang="en-US" sz="1200" dirty="0" smtClean="0"/>
-                        <a:t> = 24 horas</a:t>
-                      </a:r>
-                      <a:endParaRPr lang="pt-BR" sz="1200" dirty="0"/>
-                    </a:p>
-                  </a:txBody>
-                  <a:tcPr/>
-                </a:tc>
-                <a:tc>
-                  <a:txBody>
-                    <a:bodyPr/>
-                    <a:lstStyle/>
-                    <a:p>
-                      <a:r>
-                        <a:rPr lang="en-US" sz="1200" dirty="0" smtClean="0"/>
-                        <a:t>02 h 41 m </a:t>
-                      </a:r>
-                      <a:endParaRPr lang="pt-BR" sz="1200" dirty="0"/>
-                    </a:p>
-                  </a:txBody>
-                  <a:tcPr/>
-                </a:tc>
-              </a:tr>
-              <a:tr h="531368">
-                <a:tc>
-                  <a:txBody>
-                    <a:bodyPr/>
-                    <a:lstStyle/>
-                    <a:p>
-                      <a:r>
-                        <a:rPr lang="en-US" sz="1200" dirty="0" smtClean="0"/>
-                        <a:t>1 </a:t>
-                      </a:r>
-                      <a:r>
-                        <a:rPr lang="en-US" sz="1200" dirty="0" err="1" smtClean="0"/>
-                        <a:t>dia</a:t>
-                      </a:r>
-                      <a:r>
-                        <a:rPr lang="en-US" sz="1200" dirty="0" smtClean="0"/>
-                        <a:t> = 24 horas</a:t>
-                      </a:r>
-                      <a:endParaRPr lang="pt-BR" sz="1200" dirty="0"/>
-                    </a:p>
-                  </a:txBody>
-                  <a:tcPr/>
-                </a:tc>
-                <a:tc>
-                  <a:txBody>
-                    <a:bodyPr/>
-                    <a:lstStyle/>
-                    <a:p>
-                      <a:r>
-                        <a:rPr lang="en-US" sz="1200" smtClean="0"/>
-                        <a:t>17 h 08 m </a:t>
-                      </a:r>
-                      <a:endParaRPr lang="pt-BR" sz="1200" dirty="0"/>
-                    </a:p>
-                  </a:txBody>
-                  <a:tcPr/>
-                </a:tc>
-              </a:tr>
-              <a:tr h="531368">
-                <a:tc>
-                  <a:txBody>
-                    <a:bodyPr/>
-                    <a:lstStyle/>
-                    <a:p>
-                      <a:r>
-                        <a:rPr lang="en-US" sz="1200" dirty="0" smtClean="0"/>
-                        <a:t>1 </a:t>
-                      </a:r>
-                      <a:r>
-                        <a:rPr lang="en-US" sz="1200" dirty="0" err="1" smtClean="0"/>
-                        <a:t>dia</a:t>
-                      </a:r>
-                      <a:r>
-                        <a:rPr lang="en-US" sz="1200" baseline="0" dirty="0" smtClean="0"/>
-                        <a:t> = 24 horas</a:t>
-                      </a:r>
-                      <a:endParaRPr lang="pt-BR" sz="1200" dirty="0"/>
-                    </a:p>
-                  </a:txBody>
-                  <a:tcPr/>
-                </a:tc>
-                <a:tc>
-                  <a:txBody>
-                    <a:bodyPr/>
-                    <a:lstStyle/>
-                    <a:p>
-                      <a:r>
-                        <a:rPr lang="en-US" sz="1200" dirty="0" smtClean="0"/>
-                        <a:t>26 h 55 m </a:t>
-                      </a:r>
-                      <a:endParaRPr lang="pt-BR" sz="1200" dirty="0"/>
-                    </a:p>
-                  </a:txBody>
-                  <a:tcPr/>
-                </a:tc>
-              </a:tr>
-              <a:tr h="531368">
-                <a:tc>
-                  <a:txBody>
-                    <a:bodyPr/>
-                    <a:lstStyle/>
-                    <a:p>
-                      <a:r>
-                        <a:rPr lang="en-US" sz="1200" dirty="0" smtClean="0"/>
-                        <a:t>1 </a:t>
-                      </a:r>
-                      <a:r>
-                        <a:rPr lang="en-US" sz="1200" dirty="0" err="1" smtClean="0"/>
-                        <a:t>dia</a:t>
-                      </a:r>
-                      <a:r>
-                        <a:rPr lang="en-US" sz="1200" dirty="0" smtClean="0"/>
-                        <a:t> = 24 horas</a:t>
-                      </a:r>
-                      <a:endParaRPr lang="pt-BR" sz="1200" dirty="0"/>
-                    </a:p>
-                  </a:txBody>
-                  <a:tcPr/>
-                </a:tc>
-                <a:tc>
-                  <a:txBody>
-                    <a:bodyPr/>
-                    <a:lstStyle/>
-                    <a:p>
-                      <a:r>
-                        <a:rPr lang="pt-BR" sz="1200" dirty="0" smtClean="0"/>
-                        <a:t>22 h 59 m </a:t>
-                      </a:r>
-                      <a:endParaRPr lang="pt-BR" sz="1200" dirty="0"/>
-                    </a:p>
-                  </a:txBody>
-                  <a:tcPr/>
-                </a:tc>
-              </a:tr>
-            </a:tbl>
-          </a:graphicData>
-        </a:graphic>
-      </p:graphicFrame>
-    </p:spTree>
-    <p:extLst>
-      <p:ext uri="{BB962C8B-B14F-4D97-AF65-F5344CB8AC3E}">
-        <p14:creationId xmlns:p14="http://schemas.microsoft.com/office/powerpoint/2010/main" val="1517337299"/>
-      </p:ext>
-    </p:extLst>
-  </p:cSld>
-  <p:clrMapOvr>
-    <a:masterClrMapping/>
-  </p:clrMapOvr>
-  <p:timing>
-    <p:tnLst>
-      <p:par>
-        <p:cTn id="1" dur="indefinite" restart="never" nodeType="tmRoot"/>
-      </p:par>
-    </p:tnLst>
-  </p:timing>
-</p:sld>
-</file>
-
-<file path=ppt/slides/slide6.xml><?xml version="1.0" encoding="utf-8"?>
-<p:sld xmlns:a="http://schemas.openxmlformats.org/drawingml/2006/main" xmlns:r="http://schemas.openxmlformats.org/officeDocument/2006/relationships" xmlns:p="http://schemas.openxmlformats.org/presentationml/2006/main">
-  <p:cSld>
-    <p:spTree>
-      <p:nvGrpSpPr>
-        <p:cNvPr id="1" name=""/>
-        <p:cNvGrpSpPr/>
-        <p:nvPr/>
-      </p:nvGrpSpPr>
-      <p:grpSpPr>
-        <a:xfrm>
-          <a:off x="0" y="0"/>
-          <a:ext cx="0" cy="0"/>
-          <a:chOff x="0" y="0"/>
-          <a:chExt cx="0" cy="0"/>
-        </a:xfrm>
-      </p:grpSpPr>
       <p:sp>
         <p:nvSpPr>
           <p:cNvPr id="6" name="Right Arrow 5"/>
@@ -4708,7 +3926,7 @@
 </p:sld>
 </file>
 
-<file path=ppt/slides/slide7.xml><?xml version="1.0" encoding="utf-8"?>
+<file path=ppt/slides/slide6.xml><?xml version="1.0" encoding="utf-8"?>
 <p:sld xmlns:a="http://schemas.openxmlformats.org/drawingml/2006/main" xmlns:r="http://schemas.openxmlformats.org/officeDocument/2006/relationships" xmlns:p="http://schemas.openxmlformats.org/presentationml/2006/main">
   <p:cSld>
     <p:spTree>
@@ -5478,7 +4696,7 @@
 </p:sld>
 </file>
 
-<file path=ppt/slides/slide8.xml><?xml version="1.0" encoding="utf-8"?>
+<file path=ppt/slides/slide7.xml><?xml version="1.0" encoding="utf-8"?>
 <p:sld xmlns:a="http://schemas.openxmlformats.org/drawingml/2006/main" xmlns:r="http://schemas.openxmlformats.org/officeDocument/2006/relationships" xmlns:p="http://schemas.openxmlformats.org/presentationml/2006/main">
   <p:cSld>
     <p:spTree>
@@ -5539,7 +4757,7 @@
 </p:sld>
 </file>
 
-<file path=ppt/slides/slide9.xml><?xml version="1.0" encoding="utf-8"?>
+<file path=ppt/slides/slide8.xml><?xml version="1.0" encoding="utf-8"?>
 <p:sld xmlns:a="http://schemas.openxmlformats.org/drawingml/2006/main" xmlns:r="http://schemas.openxmlformats.org/officeDocument/2006/relationships" xmlns:p="http://schemas.openxmlformats.org/presentationml/2006/main">
   <p:cSld>
     <p:spTree>
@@ -5584,6 +4802,94 @@
     <p:extLst>
       <p:ext uri="{BB962C8B-B14F-4D97-AF65-F5344CB8AC3E}">
         <p14:creationId xmlns:p14="http://schemas.microsoft.com/office/powerpoint/2010/main" val="3267193717"/>
+      </p:ext>
+    </p:extLst>
+  </p:cSld>
+  <p:clrMapOvr>
+    <a:masterClrMapping/>
+  </p:clrMapOvr>
+</p:sld>
+</file>
+
+<file path=ppt/slides/slide9.xml><?xml version="1.0" encoding="utf-8"?>
+<p:sld xmlns:a="http://schemas.openxmlformats.org/drawingml/2006/main" xmlns:r="http://schemas.openxmlformats.org/officeDocument/2006/relationships" xmlns:p="http://schemas.openxmlformats.org/presentationml/2006/main">
+  <p:cSld>
+    <p:spTree>
+      <p:nvGrpSpPr>
+        <p:cNvPr id="1" name=""/>
+        <p:cNvGrpSpPr/>
+        <p:nvPr/>
+      </p:nvGrpSpPr>
+      <p:grpSpPr>
+        <a:xfrm>
+          <a:off x="0" y="0"/>
+          <a:ext cx="0" cy="0"/>
+          <a:chOff x="0" y="0"/>
+          <a:chExt cx="0" cy="0"/>
+        </a:xfrm>
+      </p:grpSpPr>
+      <p:sp>
+        <p:nvSpPr>
+          <p:cNvPr id="2" name="Title 1"/>
+          <p:cNvSpPr>
+            <a:spLocks noGrp="1"/>
+          </p:cNvSpPr>
+          <p:nvPr>
+            <p:ph type="title"/>
+          </p:nvPr>
+        </p:nvSpPr>
+        <p:spPr/>
+        <p:txBody>
+          <a:bodyPr/>
+          <a:lstStyle/>
+          <a:p>
+            <a:endParaRPr lang="pt-BR"/>
+          </a:p>
+        </p:txBody>
+      </p:sp>
+      <p:sp>
+        <p:nvSpPr>
+          <p:cNvPr id="3" name="Content Placeholder 2"/>
+          <p:cNvSpPr>
+            <a:spLocks noGrp="1"/>
+          </p:cNvSpPr>
+          <p:nvPr>
+            <p:ph idx="1"/>
+          </p:nvPr>
+        </p:nvSpPr>
+        <p:spPr/>
+        <p:txBody>
+          <a:bodyPr/>
+          <a:lstStyle/>
+          <a:p>
+            <a:r>
+              <a:rPr lang="en-US" dirty="0" smtClean="0"/>
+              <a:t>Alter</a:t>
+            </a:r>
+            <a:r>
+              <a:rPr lang="pt-BR" dirty="0" smtClean="0"/>
+              <a:t>ação dos Somatorios</a:t>
+            </a:r>
+          </a:p>
+          <a:p>
+            <a:r>
+              <a:rPr lang="pt-BR" dirty="0" smtClean="0"/>
+              <a:t>Alteração das Medias</a:t>
+            </a:r>
+          </a:p>
+          <a:p>
+            <a:r>
+              <a:rPr lang="pt-BR" dirty="0" smtClean="0"/>
+              <a:t>Alteração da Meta</a:t>
+            </a:r>
+            <a:endParaRPr lang="pt-BR" dirty="0"/>
+          </a:p>
+        </p:txBody>
+      </p:sp>
+    </p:spTree>
+    <p:extLst>
+      <p:ext uri="{BB962C8B-B14F-4D97-AF65-F5344CB8AC3E}">
+        <p14:creationId xmlns:p14="http://schemas.microsoft.com/office/powerpoint/2010/main" val="3296057671"/>
       </p:ext>
     </p:extLst>
   </p:cSld>

</xml_diff>